<commit_message>
review bytecode verifier introduction and schematic
schematic based on the same rendering than other application build flows
</commit_message>
<xml_diff>
--- a/ApplicationDeveloperGuide/pptx/bytecode_verifier.pptx
+++ b/ApplicationDeveloperGuide/pptx/bytecode_verifier.pptx
@@ -5,13 +5,14 @@
     <p:sldMasterId id="2147483804" r:id="rId1"/>
   </p:sldMasterIdLst>
   <p:notesMasterIdLst>
-    <p:notesMasterId r:id="rId3"/>
+    <p:notesMasterId r:id="rId4"/>
   </p:notesMasterIdLst>
   <p:handoutMasterIdLst>
-    <p:handoutMasterId r:id="rId4"/>
+    <p:handoutMasterId r:id="rId5"/>
   </p:handoutMasterIdLst>
   <p:sldIdLst>
-    <p:sldId id="7619" r:id="rId2"/>
+    <p:sldId id="7621" r:id="rId2"/>
+    <p:sldId id="7620" r:id="rId3"/>
   </p:sldIdLst>
   <p:sldSz cx="12192000" cy="6858000"/>
   <p:notesSz cx="6858000" cy="9144000"/>
@@ -230,7 +231,7 @@
               <a:rPr lang="fr-FR" smtClean="0">
                 <a:latin typeface="Calibri Regular" charset="0"/>
               </a:rPr>
-              <a:t>jeudi 7 septembre 2023</a:t>
+              <a:t>jeudi 14 septembre 2023</a:t>
             </a:fld>
             <a:endParaRPr lang="en-US" dirty="0">
               <a:latin typeface="Calibri Regular" charset="0"/>
@@ -408,7 +409,7 @@
           <a:p>
             <a:fld id="{885721CF-495B-2B41-A23A-4D3221F80235}" type="datetime2">
               <a:rPr lang="fr-FR" smtClean="0"/>
-              <a:t>jeudi 7 septembre 2023</a:t>
+              <a:t>jeudi 14 septembre 2023</a:t>
             </a:fld>
             <a:endParaRPr lang="en-US" dirty="0"/>
           </a:p>
@@ -752,7 +753,7 @@
               <a:pPr>
                 <a:defRPr/>
               </a:pPr>
-              <a:t>1</a:t>
+              <a:t>2</a:t>
             </a:fld>
             <a:endParaRPr lang="fr-FR"/>
           </a:p>
@@ -761,7 +762,7 @@
     </p:spTree>
     <p:extLst>
       <p:ext uri="{BB962C8B-B14F-4D97-AF65-F5344CB8AC3E}">
-        <p14:creationId xmlns:p14="http://schemas.microsoft.com/office/powerpoint/2010/main" val="527647083"/>
+        <p14:creationId xmlns:p14="http://schemas.microsoft.com/office/powerpoint/2010/main" val="816031056"/>
       </p:ext>
     </p:extLst>
   </p:cSld>
@@ -4211,6 +4212,1074 @@
 </file>
 
 <file path=ppt/slides/slide1.xml><?xml version="1.0" encoding="utf-8"?>
+<p:sld xmlns:a="http://schemas.openxmlformats.org/drawingml/2006/main" xmlns:r="http://schemas.openxmlformats.org/officeDocument/2006/relationships" xmlns:p="http://schemas.openxmlformats.org/presentationml/2006/main">
+  <p:cSld>
+    <p:spTree>
+      <p:nvGrpSpPr>
+        <p:cNvPr id="1" name=""/>
+        <p:cNvGrpSpPr/>
+        <p:nvPr/>
+      </p:nvGrpSpPr>
+      <p:grpSpPr>
+        <a:xfrm>
+          <a:off x="0" y="0"/>
+          <a:ext cx="0" cy="0"/>
+          <a:chOff x="0" y="0"/>
+          <a:chExt cx="0" cy="0"/>
+        </a:xfrm>
+      </p:grpSpPr>
+      <p:sp>
+        <p:nvSpPr>
+          <p:cNvPr id="2" name="Title 1">
+            <a:extLst>
+              <a:ext uri="{FF2B5EF4-FFF2-40B4-BE49-F238E27FC236}">
+                <a16:creationId xmlns:a16="http://schemas.microsoft.com/office/drawing/2014/main" id="{8D20B021-5DFC-8012-6286-15A1969A9784}"/>
+              </a:ext>
+            </a:extLst>
+          </p:cNvPr>
+          <p:cNvSpPr>
+            <a:spLocks noGrp="1"/>
+          </p:cNvSpPr>
+          <p:nvPr>
+            <p:ph type="title"/>
+          </p:nvPr>
+        </p:nvSpPr>
+        <p:spPr/>
+        <p:txBody>
+          <a:bodyPr/>
+          <a:lstStyle/>
+          <a:p>
+            <a:endParaRPr lang="en-US"/>
+          </a:p>
+        </p:txBody>
+      </p:sp>
+      <p:sp>
+        <p:nvSpPr>
+          <p:cNvPr id="3" name="Rounded Rectangle 4">
+            <a:extLst>
+              <a:ext uri="{FF2B5EF4-FFF2-40B4-BE49-F238E27FC236}">
+                <a16:creationId xmlns:a16="http://schemas.microsoft.com/office/drawing/2014/main" id="{6AC0DA00-F7F6-3B71-B57B-B9F947715939}"/>
+              </a:ext>
+            </a:extLst>
+          </p:cNvPr>
+          <p:cNvSpPr/>
+          <p:nvPr/>
+        </p:nvSpPr>
+        <p:spPr>
+          <a:xfrm>
+            <a:off x="2063552" y="1700808"/>
+            <a:ext cx="1601027" cy="488524"/>
+          </a:xfrm>
+          <a:prstGeom prst="roundRect">
+            <a:avLst>
+              <a:gd name="adj" fmla="val 11196"/>
+            </a:avLst>
+          </a:prstGeom>
+          <a:solidFill>
+            <a:schemeClr val="accent4"/>
+          </a:solidFill>
+          <a:ln>
+            <a:noFill/>
+          </a:ln>
+          <a:effectLst/>
+        </p:spPr>
+        <p:style>
+          <a:lnRef idx="2">
+            <a:schemeClr val="dk1">
+              <a:shade val="50000"/>
+            </a:schemeClr>
+          </a:lnRef>
+          <a:fillRef idx="1">
+            <a:schemeClr val="dk1"/>
+          </a:fillRef>
+          <a:effectRef idx="0">
+            <a:schemeClr val="dk1"/>
+          </a:effectRef>
+          <a:fontRef idx="minor">
+            <a:schemeClr val="lt1"/>
+          </a:fontRef>
+        </p:style>
+        <p:txBody>
+          <a:bodyPr rtlCol="0" anchor="ctr"/>
+          <a:lstStyle/>
+          <a:p>
+            <a:pPr algn="ctr">
+              <a:defRPr/>
+            </a:pPr>
+            <a:r>
+              <a:rPr lang="en-US" sz="1000" dirty="0">
+                <a:solidFill>
+                  <a:srgbClr val="FFFFFF"/>
+                </a:solidFill>
+                <a:latin typeface="Source Sans Pro Light" charset="0"/>
+                <a:ea typeface="Source Sans Pro Light" charset="0"/>
+                <a:cs typeface="Source Sans Pro Light" charset="0"/>
+              </a:rPr>
+              <a:t>Application Code</a:t>
+            </a:r>
+          </a:p>
+          <a:p>
+            <a:pPr algn="ctr">
+              <a:defRPr/>
+            </a:pPr>
+            <a:r>
+              <a:rPr lang="en-US" sz="1000" dirty="0">
+                <a:solidFill>
+                  <a:srgbClr val="FFFFFF"/>
+                </a:solidFill>
+                <a:latin typeface="Source Sans Pro Light" charset="0"/>
+                <a:ea typeface="Source Sans Pro Light" charset="0"/>
+                <a:cs typeface="Source Sans Pro Light" charset="0"/>
+              </a:rPr>
+              <a:t>Source Project</a:t>
+            </a:r>
+          </a:p>
+        </p:txBody>
+      </p:sp>
+      <p:cxnSp>
+        <p:nvCxnSpPr>
+          <p:cNvPr id="4" name="Connecteur droit avec flèche 148">
+            <a:extLst>
+              <a:ext uri="{FF2B5EF4-FFF2-40B4-BE49-F238E27FC236}">
+                <a16:creationId xmlns:a16="http://schemas.microsoft.com/office/drawing/2014/main" id="{9C2576C5-29DC-D632-C753-82896FF0E9F1}"/>
+              </a:ext>
+            </a:extLst>
+          </p:cNvPr>
+          <p:cNvCxnSpPr>
+            <a:cxnSpLocks/>
+            <a:stCxn id="3" idx="2"/>
+            <a:endCxn id="31" idx="0"/>
+          </p:cNvCxnSpPr>
+          <p:nvPr/>
+        </p:nvCxnSpPr>
+        <p:spPr>
+          <a:xfrm flipH="1">
+            <a:off x="2860566" y="2189332"/>
+            <a:ext cx="3500" cy="370865"/>
+          </a:xfrm>
+          <a:prstGeom prst="straightConnector1">
+            <a:avLst/>
+          </a:prstGeom>
+          <a:ln>
+            <a:solidFill>
+              <a:schemeClr val="tx2"/>
+            </a:solidFill>
+            <a:tailEnd type="triangle"/>
+          </a:ln>
+        </p:spPr>
+        <p:style>
+          <a:lnRef idx="1">
+            <a:schemeClr val="accent1"/>
+          </a:lnRef>
+          <a:fillRef idx="0">
+            <a:schemeClr val="accent1"/>
+          </a:fillRef>
+          <a:effectRef idx="0">
+            <a:schemeClr val="accent1"/>
+          </a:effectRef>
+          <a:fontRef idx="minor">
+            <a:schemeClr val="tx1"/>
+          </a:fontRef>
+        </p:style>
+      </p:cxnSp>
+      <p:sp>
+        <p:nvSpPr>
+          <p:cNvPr id="5" name="ZoneTexte 152">
+            <a:extLst>
+              <a:ext uri="{FF2B5EF4-FFF2-40B4-BE49-F238E27FC236}">
+                <a16:creationId xmlns:a16="http://schemas.microsoft.com/office/drawing/2014/main" id="{3690F7A2-1B6C-A48D-B1D7-DEAF0886425B}"/>
+              </a:ext>
+            </a:extLst>
+          </p:cNvPr>
+          <p:cNvSpPr txBox="1"/>
+          <p:nvPr/>
+        </p:nvSpPr>
+        <p:spPr>
+          <a:xfrm>
+            <a:off x="2844936" y="3113477"/>
+            <a:ext cx="601447" cy="246221"/>
+          </a:xfrm>
+          <a:prstGeom prst="rect">
+            <a:avLst/>
+          </a:prstGeom>
+          <a:noFill/>
+        </p:spPr>
+        <p:txBody>
+          <a:bodyPr wrap="none" rtlCol="0">
+            <a:spAutoFit/>
+          </a:bodyPr>
+          <a:lstStyle/>
+          <a:p>
+            <a:pPr>
+              <a:defRPr/>
+            </a:pPr>
+            <a:r>
+              <a:rPr lang="en-US" sz="1000" dirty="0">
+                <a:solidFill>
+                  <a:srgbClr val="97A7AF"/>
+                </a:solidFill>
+              </a:rPr>
+              <a:t>(*.class)</a:t>
+            </a:r>
+          </a:p>
+        </p:txBody>
+      </p:sp>
+      <p:sp>
+        <p:nvSpPr>
+          <p:cNvPr id="6" name="Rounded Rectangle 7">
+            <a:extLst>
+              <a:ext uri="{FF2B5EF4-FFF2-40B4-BE49-F238E27FC236}">
+                <a16:creationId xmlns:a16="http://schemas.microsoft.com/office/drawing/2014/main" id="{366A76C4-DAF3-E365-74F6-E74A1D0D04D4}"/>
+              </a:ext>
+            </a:extLst>
+          </p:cNvPr>
+          <p:cNvSpPr/>
+          <p:nvPr/>
+        </p:nvSpPr>
+        <p:spPr>
+          <a:xfrm>
+            <a:off x="2063551" y="3556057"/>
+            <a:ext cx="2989061" cy="586700"/>
+          </a:xfrm>
+          <a:prstGeom prst="roundRect">
+            <a:avLst/>
+          </a:prstGeom>
+          <a:solidFill>
+            <a:schemeClr val="tx1"/>
+          </a:solidFill>
+          <a:ln>
+            <a:noFill/>
+          </a:ln>
+          <a:effectLst/>
+        </p:spPr>
+        <p:style>
+          <a:lnRef idx="2">
+            <a:schemeClr val="dk1">
+              <a:shade val="50000"/>
+            </a:schemeClr>
+          </a:lnRef>
+          <a:fillRef idx="1">
+            <a:schemeClr val="dk1"/>
+          </a:fillRef>
+          <a:effectRef idx="0">
+            <a:schemeClr val="dk1"/>
+          </a:effectRef>
+          <a:fontRef idx="minor">
+            <a:schemeClr val="lt1"/>
+          </a:fontRef>
+        </p:style>
+        <p:txBody>
+          <a:bodyPr rtlCol="0" anchor="b"/>
+          <a:lstStyle/>
+          <a:p>
+            <a:pPr algn="ctr"/>
+            <a:r>
+              <a:rPr lang="en-US" sz="1000" dirty="0">
+                <a:solidFill>
+                  <a:srgbClr val="FFFFFF"/>
+                </a:solidFill>
+                <a:latin typeface="Source Sans Pro Light" charset="0"/>
+                <a:ea typeface="Source Sans Pro Light" charset="0"/>
+                <a:cs typeface="Source Sans Pro Light" charset="0"/>
+              </a:rPr>
+              <a:t>SOAR</a:t>
+            </a:r>
+          </a:p>
+        </p:txBody>
+      </p:sp>
+      <p:cxnSp>
+        <p:nvCxnSpPr>
+          <p:cNvPr id="23" name="Connecteur droit avec flèche 148">
+            <a:extLst>
+              <a:ext uri="{FF2B5EF4-FFF2-40B4-BE49-F238E27FC236}">
+                <a16:creationId xmlns:a16="http://schemas.microsoft.com/office/drawing/2014/main" id="{4BC6ABC1-279C-FAA7-6508-D2DBC9A7D826}"/>
+              </a:ext>
+            </a:extLst>
+          </p:cNvPr>
+          <p:cNvCxnSpPr>
+            <a:cxnSpLocks/>
+          </p:cNvCxnSpPr>
+          <p:nvPr/>
+        </p:nvCxnSpPr>
+        <p:spPr>
+          <a:xfrm flipH="1">
+            <a:off x="3410799" y="4142757"/>
+            <a:ext cx="1560" cy="488199"/>
+          </a:xfrm>
+          <a:prstGeom prst="straightConnector1">
+            <a:avLst/>
+          </a:prstGeom>
+          <a:ln>
+            <a:solidFill>
+              <a:schemeClr val="tx2"/>
+            </a:solidFill>
+            <a:tailEnd type="triangle"/>
+          </a:ln>
+        </p:spPr>
+        <p:style>
+          <a:lnRef idx="1">
+            <a:schemeClr val="accent1"/>
+          </a:lnRef>
+          <a:fillRef idx="0">
+            <a:schemeClr val="accent1"/>
+          </a:fillRef>
+          <a:effectRef idx="0">
+            <a:schemeClr val="accent1"/>
+          </a:effectRef>
+          <a:fontRef idx="minor">
+            <a:schemeClr val="tx1"/>
+          </a:fontRef>
+        </p:style>
+      </p:cxnSp>
+      <p:sp>
+        <p:nvSpPr>
+          <p:cNvPr id="24" name="ZoneTexte 152">
+            <a:extLst>
+              <a:ext uri="{FF2B5EF4-FFF2-40B4-BE49-F238E27FC236}">
+                <a16:creationId xmlns:a16="http://schemas.microsoft.com/office/drawing/2014/main" id="{623C71A6-570F-254C-3CFC-B34E41582369}"/>
+              </a:ext>
+            </a:extLst>
+          </p:cNvPr>
+          <p:cNvSpPr txBox="1"/>
+          <p:nvPr/>
+        </p:nvSpPr>
+        <p:spPr>
+          <a:xfrm>
+            <a:off x="3356041" y="4339116"/>
+            <a:ext cx="1762021" cy="246221"/>
+          </a:xfrm>
+          <a:prstGeom prst="rect">
+            <a:avLst/>
+          </a:prstGeom>
+          <a:noFill/>
+        </p:spPr>
+        <p:txBody>
+          <a:bodyPr wrap="none" rtlCol="0">
+            <a:spAutoFit/>
+          </a:bodyPr>
+          <a:lstStyle/>
+          <a:p>
+            <a:pPr>
+              <a:defRPr/>
+            </a:pPr>
+            <a:r>
+              <a:rPr lang="en-US" sz="1000" dirty="0">
+                <a:solidFill>
+                  <a:srgbClr val="97A7AF"/>
+                </a:solidFill>
+              </a:rPr>
+              <a:t>(</a:t>
+            </a:r>
+            <a:r>
+              <a:rPr lang="en-US" sz="1000" dirty="0" err="1">
+                <a:solidFill>
+                  <a:srgbClr val="97A7AF"/>
+                </a:solidFill>
+              </a:rPr>
+              <a:t>microejapp.o</a:t>
+            </a:r>
+            <a:r>
+              <a:rPr lang="en-US" sz="1000" dirty="0">
+                <a:solidFill>
+                  <a:srgbClr val="97A7AF"/>
+                </a:solidFill>
+              </a:rPr>
+              <a:t> / application.fo)</a:t>
+            </a:r>
+          </a:p>
+        </p:txBody>
+      </p:sp>
+      <p:cxnSp>
+        <p:nvCxnSpPr>
+          <p:cNvPr id="26" name="Connecteur droit avec flèche 148">
+            <a:extLst>
+              <a:ext uri="{FF2B5EF4-FFF2-40B4-BE49-F238E27FC236}">
+                <a16:creationId xmlns:a16="http://schemas.microsoft.com/office/drawing/2014/main" id="{365FC9E6-E38D-F85B-0F19-E128805B43AC}"/>
+              </a:ext>
+            </a:extLst>
+          </p:cNvPr>
+          <p:cNvCxnSpPr>
+            <a:cxnSpLocks/>
+            <a:stCxn id="27" idx="2"/>
+          </p:cNvCxnSpPr>
+          <p:nvPr/>
+        </p:nvCxnSpPr>
+        <p:spPr>
+          <a:xfrm>
+            <a:off x="4415730" y="2946086"/>
+            <a:ext cx="0" cy="424893"/>
+          </a:xfrm>
+          <a:prstGeom prst="straightConnector1">
+            <a:avLst/>
+          </a:prstGeom>
+          <a:ln w="0">
+            <a:solidFill>
+              <a:schemeClr val="tx2"/>
+            </a:solidFill>
+            <a:tailEnd type="triangle"/>
+          </a:ln>
+        </p:spPr>
+        <p:style>
+          <a:lnRef idx="1">
+            <a:schemeClr val="accent1"/>
+          </a:lnRef>
+          <a:fillRef idx="0">
+            <a:schemeClr val="accent1"/>
+          </a:fillRef>
+          <a:effectRef idx="0">
+            <a:schemeClr val="accent1"/>
+          </a:effectRef>
+          <a:fontRef idx="minor">
+            <a:schemeClr val="tx1"/>
+          </a:fontRef>
+        </p:style>
+      </p:cxnSp>
+      <p:sp>
+        <p:nvSpPr>
+          <p:cNvPr id="27" name="Rounded Rectangle 36">
+            <a:extLst>
+              <a:ext uri="{FF2B5EF4-FFF2-40B4-BE49-F238E27FC236}">
+                <a16:creationId xmlns:a16="http://schemas.microsoft.com/office/drawing/2014/main" id="{390E0C69-4669-6D5E-9952-F7EE25FDF484}"/>
+              </a:ext>
+            </a:extLst>
+          </p:cNvPr>
+          <p:cNvSpPr/>
+          <p:nvPr/>
+        </p:nvSpPr>
+        <p:spPr>
+          <a:xfrm>
+            <a:off x="3778845" y="1698337"/>
+            <a:ext cx="1273769" cy="1247749"/>
+          </a:xfrm>
+          <a:prstGeom prst="roundRect">
+            <a:avLst>
+              <a:gd name="adj" fmla="val 7525"/>
+            </a:avLst>
+          </a:prstGeom>
+          <a:solidFill>
+            <a:schemeClr val="accent4"/>
+          </a:solidFill>
+          <a:ln w="12700">
+            <a:noFill/>
+          </a:ln>
+          <a:effectLst/>
+        </p:spPr>
+        <p:style>
+          <a:lnRef idx="2">
+            <a:schemeClr val="dk1"/>
+          </a:lnRef>
+          <a:fillRef idx="1">
+            <a:schemeClr val="lt1"/>
+          </a:fillRef>
+          <a:effectRef idx="0">
+            <a:schemeClr val="dk1"/>
+          </a:effectRef>
+          <a:fontRef idx="minor">
+            <a:schemeClr val="dk1"/>
+          </a:fontRef>
+        </p:style>
+        <p:txBody>
+          <a:bodyPr wrap="square" tIns="36000" bIns="36000" rtlCol="0" anchor="ctr" anchorCtr="0">
+            <a:noAutofit/>
+          </a:bodyPr>
+          <a:lstStyle/>
+          <a:p>
+            <a:pPr algn="ctr">
+              <a:defRPr/>
+            </a:pPr>
+            <a:r>
+              <a:rPr lang="en-US" sz="1000" dirty="0">
+                <a:solidFill>
+                  <a:srgbClr val="FFFFFF"/>
+                </a:solidFill>
+                <a:latin typeface="Source Sans Pro Light" charset="0"/>
+                <a:ea typeface="Source Sans Pro Light" charset="0"/>
+                <a:cs typeface="Source Sans Pro Light" charset="0"/>
+              </a:rPr>
+              <a:t>Libraries</a:t>
+            </a:r>
+          </a:p>
+          <a:p>
+            <a:pPr algn="ctr">
+              <a:defRPr/>
+            </a:pPr>
+            <a:r>
+              <a:rPr lang="en-US" sz="1000" dirty="0">
+                <a:solidFill>
+                  <a:srgbClr val="FFFFFF"/>
+                </a:solidFill>
+                <a:latin typeface="Source Sans Pro Light" charset="0"/>
+                <a:ea typeface="Source Sans Pro Light" charset="0"/>
+                <a:cs typeface="Source Sans Pro Light" charset="0"/>
+              </a:rPr>
+              <a:t>&amp; </a:t>
+            </a:r>
+          </a:p>
+          <a:p>
+            <a:pPr algn="ctr">
+              <a:defRPr/>
+            </a:pPr>
+            <a:r>
+              <a:rPr lang="en-US" sz="1000" dirty="0">
+                <a:solidFill>
+                  <a:srgbClr val="FFFFFF"/>
+                </a:solidFill>
+                <a:latin typeface="Source Sans Pro Light" charset="0"/>
+                <a:ea typeface="Source Sans Pro Light" charset="0"/>
+                <a:cs typeface="Source Sans Pro Light" charset="0"/>
+              </a:rPr>
+              <a:t>Dependencies</a:t>
+            </a:r>
+          </a:p>
+          <a:p>
+            <a:pPr algn="ctr">
+              <a:defRPr/>
+            </a:pPr>
+            <a:endParaRPr lang="en-US" sz="1000" dirty="0">
+              <a:solidFill>
+                <a:srgbClr val="FFFFFF"/>
+              </a:solidFill>
+              <a:latin typeface="Source Sans Pro Light" charset="0"/>
+              <a:ea typeface="Source Sans Pro Light" charset="0"/>
+              <a:cs typeface="Source Sans Pro Light" charset="0"/>
+            </a:endParaRPr>
+          </a:p>
+          <a:p>
+            <a:pPr algn="ctr">
+              <a:defRPr/>
+            </a:pPr>
+            <a:r>
+              <a:rPr lang="en-US" sz="1000" dirty="0">
+                <a:solidFill>
+                  <a:srgbClr val="FFFFFF"/>
+                </a:solidFill>
+                <a:latin typeface="Source Sans Pro Light" charset="0"/>
+                <a:ea typeface="Source Sans Pro Light" charset="0"/>
+                <a:cs typeface="Source Sans Pro Light" charset="0"/>
+              </a:rPr>
+              <a:t>(including Third Party code)</a:t>
+            </a:r>
+            <a:endParaRPr lang="en-US" sz="1000" dirty="0">
+              <a:solidFill>
+                <a:schemeClr val="bg1"/>
+              </a:solidFill>
+              <a:latin typeface="Source Sans Pro Light" charset="0"/>
+              <a:ea typeface="Source Sans Pro Light" charset="0"/>
+              <a:cs typeface="Source Sans Pro Light" charset="0"/>
+            </a:endParaRPr>
+          </a:p>
+        </p:txBody>
+      </p:sp>
+      <p:sp>
+        <p:nvSpPr>
+          <p:cNvPr id="30" name="ZoneTexte 152">
+            <a:extLst>
+              <a:ext uri="{FF2B5EF4-FFF2-40B4-BE49-F238E27FC236}">
+                <a16:creationId xmlns:a16="http://schemas.microsoft.com/office/drawing/2014/main" id="{7EEC0A01-F496-ED63-BF0B-60EE2E6CA001}"/>
+              </a:ext>
+            </a:extLst>
+          </p:cNvPr>
+          <p:cNvSpPr txBox="1"/>
+          <p:nvPr/>
+        </p:nvSpPr>
+        <p:spPr>
+          <a:xfrm>
+            <a:off x="4431140" y="3113477"/>
+            <a:ext cx="492443" cy="246221"/>
+          </a:xfrm>
+          <a:prstGeom prst="rect">
+            <a:avLst/>
+          </a:prstGeom>
+          <a:noFill/>
+        </p:spPr>
+        <p:txBody>
+          <a:bodyPr wrap="none" rtlCol="0">
+            <a:spAutoFit/>
+          </a:bodyPr>
+          <a:lstStyle/>
+          <a:p>
+            <a:pPr>
+              <a:defRPr/>
+            </a:pPr>
+            <a:r>
+              <a:rPr lang="en-US" sz="1000" dirty="0">
+                <a:solidFill>
+                  <a:srgbClr val="97A7AF"/>
+                </a:solidFill>
+              </a:rPr>
+              <a:t>(*.jar)</a:t>
+            </a:r>
+          </a:p>
+        </p:txBody>
+      </p:sp>
+      <p:sp>
+        <p:nvSpPr>
+          <p:cNvPr id="31" name="Rounded Rectangle 7">
+            <a:extLst>
+              <a:ext uri="{FF2B5EF4-FFF2-40B4-BE49-F238E27FC236}">
+                <a16:creationId xmlns:a16="http://schemas.microsoft.com/office/drawing/2014/main" id="{DDB9FD40-699B-F6D3-F289-7659CC337A2C}"/>
+              </a:ext>
+            </a:extLst>
+          </p:cNvPr>
+          <p:cNvSpPr/>
+          <p:nvPr/>
+        </p:nvSpPr>
+        <p:spPr>
+          <a:xfrm>
+            <a:off x="2056552" y="2560197"/>
+            <a:ext cx="1608028" cy="385889"/>
+          </a:xfrm>
+          <a:prstGeom prst="roundRect">
+            <a:avLst/>
+          </a:prstGeom>
+          <a:solidFill>
+            <a:schemeClr val="tx1"/>
+          </a:solidFill>
+          <a:ln>
+            <a:noFill/>
+          </a:ln>
+          <a:effectLst/>
+        </p:spPr>
+        <p:style>
+          <a:lnRef idx="2">
+            <a:schemeClr val="dk1">
+              <a:shade val="50000"/>
+            </a:schemeClr>
+          </a:lnRef>
+          <a:fillRef idx="1">
+            <a:schemeClr val="dk1"/>
+          </a:fillRef>
+          <a:effectRef idx="0">
+            <a:schemeClr val="dk1"/>
+          </a:effectRef>
+          <a:fontRef idx="minor">
+            <a:schemeClr val="lt1"/>
+          </a:fontRef>
+        </p:style>
+        <p:txBody>
+          <a:bodyPr rtlCol="0" anchor="ctr"/>
+          <a:lstStyle/>
+          <a:p>
+            <a:pPr algn="ctr"/>
+            <a:r>
+              <a:rPr lang="en-US" sz="1000" dirty="0">
+                <a:solidFill>
+                  <a:srgbClr val="FFFFFF"/>
+                </a:solidFill>
+                <a:latin typeface="Source Sans Pro Light" charset="0"/>
+                <a:ea typeface="Source Sans Pro Light" charset="0"/>
+                <a:cs typeface="Source Sans Pro Light" charset="0"/>
+              </a:rPr>
+              <a:t>Java Compiler (JDT)</a:t>
+            </a:r>
+          </a:p>
+        </p:txBody>
+      </p:sp>
+      <p:cxnSp>
+        <p:nvCxnSpPr>
+          <p:cNvPr id="32" name="Connecteur droit avec flèche 148">
+            <a:extLst>
+              <a:ext uri="{FF2B5EF4-FFF2-40B4-BE49-F238E27FC236}">
+                <a16:creationId xmlns:a16="http://schemas.microsoft.com/office/drawing/2014/main" id="{16E2DE4C-EE7C-DDFC-491D-0CDDC27EC27C}"/>
+              </a:ext>
+            </a:extLst>
+          </p:cNvPr>
+          <p:cNvCxnSpPr>
+            <a:cxnSpLocks/>
+            <a:stCxn id="31" idx="2"/>
+          </p:cNvCxnSpPr>
+          <p:nvPr/>
+        </p:nvCxnSpPr>
+        <p:spPr>
+          <a:xfrm>
+            <a:off x="2860566" y="2946086"/>
+            <a:ext cx="0" cy="429700"/>
+          </a:xfrm>
+          <a:prstGeom prst="straightConnector1">
+            <a:avLst/>
+          </a:prstGeom>
+          <a:ln>
+            <a:solidFill>
+              <a:schemeClr val="tx2"/>
+            </a:solidFill>
+            <a:tailEnd type="triangle"/>
+          </a:ln>
+        </p:spPr>
+        <p:style>
+          <a:lnRef idx="1">
+            <a:schemeClr val="accent1"/>
+          </a:lnRef>
+          <a:fillRef idx="0">
+            <a:schemeClr val="accent1"/>
+          </a:fillRef>
+          <a:effectRef idx="0">
+            <a:schemeClr val="accent1"/>
+          </a:effectRef>
+          <a:fontRef idx="minor">
+            <a:schemeClr val="tx1"/>
+          </a:fontRef>
+        </p:style>
+      </p:cxnSp>
+      <p:sp>
+        <p:nvSpPr>
+          <p:cNvPr id="38" name="ZoneTexte 152">
+            <a:extLst>
+              <a:ext uri="{FF2B5EF4-FFF2-40B4-BE49-F238E27FC236}">
+                <a16:creationId xmlns:a16="http://schemas.microsoft.com/office/drawing/2014/main" id="{2B70938F-605A-F662-4283-EA274B410EB1}"/>
+              </a:ext>
+            </a:extLst>
+          </p:cNvPr>
+          <p:cNvSpPr txBox="1"/>
+          <p:nvPr/>
+        </p:nvSpPr>
+        <p:spPr>
+          <a:xfrm>
+            <a:off x="2854974" y="2276684"/>
+            <a:ext cx="564578" cy="246221"/>
+          </a:xfrm>
+          <a:prstGeom prst="rect">
+            <a:avLst/>
+          </a:prstGeom>
+          <a:noFill/>
+        </p:spPr>
+        <p:txBody>
+          <a:bodyPr wrap="none" rtlCol="0">
+            <a:spAutoFit/>
+          </a:bodyPr>
+          <a:lstStyle/>
+          <a:p>
+            <a:pPr>
+              <a:defRPr/>
+            </a:pPr>
+            <a:r>
+              <a:rPr lang="en-US" sz="1000" dirty="0">
+                <a:solidFill>
+                  <a:srgbClr val="97A7AF"/>
+                </a:solidFill>
+              </a:rPr>
+              <a:t>(*.java)</a:t>
+            </a:r>
+          </a:p>
+        </p:txBody>
+      </p:sp>
+      <p:sp>
+        <p:nvSpPr>
+          <p:cNvPr id="39" name="Rounded Rectangle 7">
+            <a:extLst>
+              <a:ext uri="{FF2B5EF4-FFF2-40B4-BE49-F238E27FC236}">
+                <a16:creationId xmlns:a16="http://schemas.microsoft.com/office/drawing/2014/main" id="{718D6E21-C4A3-60F8-9A98-C76851D90CC7}"/>
+              </a:ext>
+            </a:extLst>
+          </p:cNvPr>
+          <p:cNvSpPr/>
+          <p:nvPr/>
+        </p:nvSpPr>
+        <p:spPr>
+          <a:xfrm>
+            <a:off x="2423592" y="3374393"/>
+            <a:ext cx="2309038" cy="465786"/>
+          </a:xfrm>
+          <a:prstGeom prst="roundRect">
+            <a:avLst/>
+          </a:prstGeom>
+          <a:solidFill>
+            <a:schemeClr val="bg2">
+              <a:lumMod val="50000"/>
+            </a:schemeClr>
+          </a:solidFill>
+          <a:ln>
+            <a:noFill/>
+          </a:ln>
+          <a:effectLst/>
+        </p:spPr>
+        <p:style>
+          <a:lnRef idx="2">
+            <a:schemeClr val="dk1">
+              <a:shade val="50000"/>
+            </a:schemeClr>
+          </a:lnRef>
+          <a:fillRef idx="1">
+            <a:schemeClr val="dk1"/>
+          </a:fillRef>
+          <a:effectRef idx="0">
+            <a:schemeClr val="dk1"/>
+          </a:effectRef>
+          <a:fontRef idx="minor">
+            <a:schemeClr val="lt1"/>
+          </a:fontRef>
+        </p:style>
+        <p:txBody>
+          <a:bodyPr rtlCol="0" anchor="ctr"/>
+          <a:lstStyle/>
+          <a:p>
+            <a:pPr algn="ctr"/>
+            <a:r>
+              <a:rPr lang="en-US" sz="1000" dirty="0">
+                <a:solidFill>
+                  <a:srgbClr val="FFFFFF"/>
+                </a:solidFill>
+                <a:latin typeface="Source Sans Pro Light" charset="0"/>
+                <a:ea typeface="Source Sans Pro Light" charset="0"/>
+                <a:cs typeface="Source Sans Pro Light" charset="0"/>
+              </a:rPr>
+              <a:t>Bytecode Verifier</a:t>
+            </a:r>
+          </a:p>
+        </p:txBody>
+      </p:sp>
+      <p:pic>
+        <p:nvPicPr>
+          <p:cNvPr id="41" name="Picture 40">
+            <a:extLst>
+              <a:ext uri="{FF2B5EF4-FFF2-40B4-BE49-F238E27FC236}">
+                <a16:creationId xmlns:a16="http://schemas.microsoft.com/office/drawing/2014/main" id="{21EC412B-26A6-CEFE-5403-1F81045AFDA0}"/>
+              </a:ext>
+            </a:extLst>
+          </p:cNvPr>
+          <p:cNvPicPr>
+            <a:picLocks noChangeAspect="1"/>
+          </p:cNvPicPr>
+          <p:nvPr/>
+        </p:nvPicPr>
+        <p:blipFill>
+          <a:blip r:embed="rId2">
+            <a:extLst>
+              <a:ext uri="{28A0092B-C50C-407E-A947-70E740481C1C}">
+                <a14:useLocalDpi xmlns:a14="http://schemas.microsoft.com/office/drawing/2010/main" val="0"/>
+              </a:ext>
+            </a:extLst>
+          </a:blip>
+          <a:stretch>
+            <a:fillRect/>
+          </a:stretch>
+        </p:blipFill>
+        <p:spPr>
+          <a:xfrm>
+            <a:off x="2498813" y="3408555"/>
+            <a:ext cx="322936" cy="397462"/>
+          </a:xfrm>
+          <a:prstGeom prst="rect">
+            <a:avLst/>
+          </a:prstGeom>
+        </p:spPr>
+      </p:pic>
+      <p:sp>
+        <p:nvSpPr>
+          <p:cNvPr id="7" name="Rounded Rectangle 11">
+            <a:extLst>
+              <a:ext uri="{FF2B5EF4-FFF2-40B4-BE49-F238E27FC236}">
+                <a16:creationId xmlns:a16="http://schemas.microsoft.com/office/drawing/2014/main" id="{CE2125C3-5105-F83C-5134-067F694479B3}"/>
+              </a:ext>
+            </a:extLst>
+          </p:cNvPr>
+          <p:cNvSpPr/>
+          <p:nvPr/>
+        </p:nvSpPr>
+        <p:spPr>
+          <a:xfrm>
+            <a:off x="3066120" y="4975148"/>
+            <a:ext cx="740457" cy="758108"/>
+          </a:xfrm>
+          <a:prstGeom prst="roundRect">
+            <a:avLst>
+              <a:gd name="adj" fmla="val 7525"/>
+            </a:avLst>
+          </a:prstGeom>
+          <a:solidFill>
+            <a:schemeClr val="bg1"/>
+          </a:solidFill>
+          <a:ln>
+            <a:noFill/>
+          </a:ln>
+          <a:effectLst/>
+        </p:spPr>
+        <p:style>
+          <a:lnRef idx="2">
+            <a:schemeClr val="dk1">
+              <a:shade val="50000"/>
+            </a:schemeClr>
+          </a:lnRef>
+          <a:fillRef idx="1">
+            <a:schemeClr val="dk1"/>
+          </a:fillRef>
+          <a:effectRef idx="0">
+            <a:schemeClr val="dk1"/>
+          </a:effectRef>
+          <a:fontRef idx="minor">
+            <a:schemeClr val="lt1"/>
+          </a:fontRef>
+        </p:style>
+        <p:txBody>
+          <a:bodyPr rtlCol="0" anchor="ctr"/>
+          <a:lstStyle/>
+          <a:p>
+            <a:pPr algn="ctr">
+              <a:defRPr/>
+            </a:pPr>
+            <a:endParaRPr lang="en-US" sz="1000" dirty="0">
+              <a:solidFill>
+                <a:srgbClr val="FFFFFF"/>
+              </a:solidFill>
+              <a:latin typeface="Source Sans Pro Light" charset="0"/>
+              <a:ea typeface="Source Sans Pro Light" charset="0"/>
+              <a:cs typeface="Source Sans Pro Light" charset="0"/>
+            </a:endParaRPr>
+          </a:p>
+        </p:txBody>
+      </p:sp>
+      <p:sp>
+        <p:nvSpPr>
+          <p:cNvPr id="8" name="Rectangle 7">
+            <a:extLst>
+              <a:ext uri="{FF2B5EF4-FFF2-40B4-BE49-F238E27FC236}">
+                <a16:creationId xmlns:a16="http://schemas.microsoft.com/office/drawing/2014/main" id="{514AC80B-F8AE-FDF1-5EE3-6F242804BFBB}"/>
+              </a:ext>
+            </a:extLst>
+          </p:cNvPr>
+          <p:cNvSpPr/>
+          <p:nvPr/>
+        </p:nvSpPr>
+        <p:spPr>
+          <a:xfrm>
+            <a:off x="3010730" y="4973108"/>
+            <a:ext cx="871306" cy="219744"/>
+          </a:xfrm>
+          <a:prstGeom prst="rect">
+            <a:avLst/>
+          </a:prstGeom>
+          <a:noFill/>
+          <a:ln>
+            <a:noFill/>
+          </a:ln>
+          <a:effectLst/>
+        </p:spPr>
+        <p:style>
+          <a:lnRef idx="2">
+            <a:schemeClr val="dk1">
+              <a:shade val="50000"/>
+            </a:schemeClr>
+          </a:lnRef>
+          <a:fillRef idx="1">
+            <a:schemeClr val="dk1"/>
+          </a:fillRef>
+          <a:effectRef idx="0">
+            <a:schemeClr val="dk1"/>
+          </a:effectRef>
+          <a:fontRef idx="minor">
+            <a:schemeClr val="lt1"/>
+          </a:fontRef>
+        </p:style>
+        <p:txBody>
+          <a:bodyPr rtlCol="0" anchor="t"/>
+          <a:lstStyle/>
+          <a:p>
+            <a:pPr algn="ctr">
+              <a:defRPr/>
+            </a:pPr>
+            <a:r>
+              <a:rPr lang="en-US" sz="1000" b="1" dirty="0">
+                <a:solidFill>
+                  <a:schemeClr val="tx1"/>
+                </a:solidFill>
+                <a:latin typeface="Source Sans Pro" charset="0"/>
+                <a:ea typeface="Source Sans Pro" charset="0"/>
+                <a:cs typeface="Source Sans Pro" charset="0"/>
+              </a:rPr>
+              <a:t>MEJ32 Core</a:t>
+            </a:r>
+          </a:p>
+        </p:txBody>
+      </p:sp>
+      <p:pic>
+        <p:nvPicPr>
+          <p:cNvPr id="9" name="Picture 8">
+            <a:extLst>
+              <a:ext uri="{FF2B5EF4-FFF2-40B4-BE49-F238E27FC236}">
+                <a16:creationId xmlns:a16="http://schemas.microsoft.com/office/drawing/2014/main" id="{53E0BB7C-40E6-797A-AD65-D31F6D5BBCB5}"/>
+              </a:ext>
+            </a:extLst>
+          </p:cNvPr>
+          <p:cNvPicPr>
+            <a:picLocks noChangeAspect="1"/>
+          </p:cNvPicPr>
+          <p:nvPr/>
+        </p:nvPicPr>
+        <p:blipFill>
+          <a:blip r:embed="rId3" cstate="print">
+            <a:extLst>
+              <a:ext uri="{28A0092B-C50C-407E-A947-70E740481C1C}">
+                <a14:useLocalDpi xmlns:a14="http://schemas.microsoft.com/office/drawing/2010/main" val="0"/>
+              </a:ext>
+            </a:extLst>
+          </a:blip>
+          <a:stretch>
+            <a:fillRect/>
+          </a:stretch>
+        </p:blipFill>
+        <p:spPr>
+          <a:xfrm>
+            <a:off x="3193062" y="5192685"/>
+            <a:ext cx="456454" cy="459496"/>
+          </a:xfrm>
+          <a:prstGeom prst="rect">
+            <a:avLst/>
+          </a:prstGeom>
+        </p:spPr>
+      </p:pic>
+      <p:sp>
+        <p:nvSpPr>
+          <p:cNvPr id="11" name="TextBox 10">
+            <a:extLst>
+              <a:ext uri="{FF2B5EF4-FFF2-40B4-BE49-F238E27FC236}">
+                <a16:creationId xmlns:a16="http://schemas.microsoft.com/office/drawing/2014/main" id="{0680C9AE-05A7-890D-7135-F5860B98F220}"/>
+              </a:ext>
+            </a:extLst>
+          </p:cNvPr>
+          <p:cNvSpPr txBox="1"/>
+          <p:nvPr/>
+        </p:nvSpPr>
+        <p:spPr>
+          <a:xfrm>
+            <a:off x="2363670" y="4670530"/>
+            <a:ext cx="2094257" cy="307777"/>
+          </a:xfrm>
+          <a:prstGeom prst="rect">
+            <a:avLst/>
+          </a:prstGeom>
+          <a:noFill/>
+        </p:spPr>
+        <p:txBody>
+          <a:bodyPr wrap="square">
+            <a:spAutoFit/>
+          </a:bodyPr>
+          <a:lstStyle/>
+          <a:p>
+            <a:pPr algn="ctr"/>
+            <a:r>
+              <a:rPr lang="en-US" sz="1400" dirty="0">
+                <a:latin typeface="Source Sans Pro Light" charset="0"/>
+                <a:ea typeface="Source Sans Pro Light" charset="0"/>
+                <a:cs typeface="Source Sans Pro Light" charset="0"/>
+              </a:rPr>
+              <a:t>Safe Runtime Execution</a:t>
+            </a:r>
+          </a:p>
+        </p:txBody>
+      </p:sp>
+    </p:spTree>
+    <p:extLst>
+      <p:ext uri="{BB962C8B-B14F-4D97-AF65-F5344CB8AC3E}">
+        <p14:creationId xmlns:p14="http://schemas.microsoft.com/office/powerpoint/2010/main" val="3365121643"/>
+      </p:ext>
+    </p:extLst>
+  </p:cSld>
+  <p:clrMapOvr>
+    <a:masterClrMapping/>
+  </p:clrMapOvr>
+</p:sld>
+</file>
+
+<file path=ppt/slides/slide2.xml><?xml version="1.0" encoding="utf-8"?>
 <p:sld xmlns:a="http://schemas.openxmlformats.org/drawingml/2006/main" xmlns:r="http://schemas.openxmlformats.org/officeDocument/2006/relationships" xmlns:p="http://schemas.openxmlformats.org/presentationml/2006/main" showMasterSp="0">
   <p:cSld>
     <p:spTree>
@@ -6359,7 +7428,7 @@
     </p:spTree>
     <p:extLst>
       <p:ext uri="{BB962C8B-B14F-4D97-AF65-F5344CB8AC3E}">
-        <p14:creationId xmlns:p14="http://schemas.microsoft.com/office/powerpoint/2010/main" val="406058680"/>
+        <p14:creationId xmlns:p14="http://schemas.microsoft.com/office/powerpoint/2010/main" val="2173038861"/>
       </p:ext>
     </p:extLst>
   </p:cSld>

</xml_diff>

<commit_message>
rename to binary code verifier
prepare the future webassembly support: this is not only a bytecode verifier
</commit_message>
<xml_diff>
--- a/ApplicationDeveloperGuide/pptx/bytecode_verifier.pptx
+++ b/ApplicationDeveloperGuide/pptx/bytecode_verifier.pptx
@@ -231,7 +231,7 @@
               <a:rPr lang="fr-FR" smtClean="0">
                 <a:latin typeface="Calibri Regular" charset="0"/>
               </a:rPr>
-              <a:t>jeudi 14 septembre 2023</a:t>
+              <a:t>mercredi 20 septembre 2023</a:t>
             </a:fld>
             <a:endParaRPr lang="en-US" dirty="0">
               <a:latin typeface="Calibri Regular" charset="0"/>
@@ -409,7 +409,7 @@
           <a:p>
             <a:fld id="{885721CF-495B-2B41-A23A-4D3221F80235}" type="datetime2">
               <a:rPr lang="fr-FR" smtClean="0"/>
-              <a:t>jeudi 14 septembre 2023</a:t>
+              <a:t>mercredi 20 septembre 2023</a:t>
             </a:fld>
             <a:endParaRPr lang="en-US" dirty="0"/>
           </a:p>
@@ -5022,7 +5022,7 @@
                 <a:ea typeface="Source Sans Pro Light" charset="0"/>
                 <a:cs typeface="Source Sans Pro Light" charset="0"/>
               </a:rPr>
-              <a:t>Bytecode Verifier</a:t>
+              <a:t>Binary Code Verifier</a:t>
             </a:r>
           </a:p>
         </p:txBody>

</xml_diff>